<commit_message>
AJOUT : reac_list examples, close #2. "XS" to "ND"
</commit_message>
<xml_diff>
--- a/docs/images/Image_maker.pptx
+++ b/docs/images/Image_maker.pptx
@@ -267,7 +267,7 @@
           <a:p>
             <a:fld id="{E382C574-8341-433E-8278-D812E3904DB0}" type="datetimeFigureOut">
               <a:rPr lang="fr-FR" smtClean="0"/>
-              <a:t>08/10/2025</a:t>
+              <a:t>18/12/2025</a:t>
             </a:fld>
             <a:endParaRPr lang="fr-FR"/>
           </a:p>
@@ -467,7 +467,7 @@
           <a:p>
             <a:fld id="{E382C574-8341-433E-8278-D812E3904DB0}" type="datetimeFigureOut">
               <a:rPr lang="fr-FR" smtClean="0"/>
-              <a:t>08/10/2025</a:t>
+              <a:t>18/12/2025</a:t>
             </a:fld>
             <a:endParaRPr lang="fr-FR"/>
           </a:p>
@@ -677,7 +677,7 @@
           <a:p>
             <a:fld id="{E382C574-8341-433E-8278-D812E3904DB0}" type="datetimeFigureOut">
               <a:rPr lang="fr-FR" smtClean="0"/>
-              <a:t>08/10/2025</a:t>
+              <a:t>18/12/2025</a:t>
             </a:fld>
             <a:endParaRPr lang="fr-FR"/>
           </a:p>
@@ -877,7 +877,7 @@
           <a:p>
             <a:fld id="{E382C574-8341-433E-8278-D812E3904DB0}" type="datetimeFigureOut">
               <a:rPr lang="fr-FR" smtClean="0"/>
-              <a:t>08/10/2025</a:t>
+              <a:t>18/12/2025</a:t>
             </a:fld>
             <a:endParaRPr lang="fr-FR"/>
           </a:p>
@@ -1153,7 +1153,7 @@
           <a:p>
             <a:fld id="{E382C574-8341-433E-8278-D812E3904DB0}" type="datetimeFigureOut">
               <a:rPr lang="fr-FR" smtClean="0"/>
-              <a:t>08/10/2025</a:t>
+              <a:t>18/12/2025</a:t>
             </a:fld>
             <a:endParaRPr lang="fr-FR"/>
           </a:p>
@@ -1421,7 +1421,7 @@
           <a:p>
             <a:fld id="{E382C574-8341-433E-8278-D812E3904DB0}" type="datetimeFigureOut">
               <a:rPr lang="fr-FR" smtClean="0"/>
-              <a:t>08/10/2025</a:t>
+              <a:t>18/12/2025</a:t>
             </a:fld>
             <a:endParaRPr lang="fr-FR"/>
           </a:p>
@@ -1836,7 +1836,7 @@
           <a:p>
             <a:fld id="{E382C574-8341-433E-8278-D812E3904DB0}" type="datetimeFigureOut">
               <a:rPr lang="fr-FR" smtClean="0"/>
-              <a:t>08/10/2025</a:t>
+              <a:t>18/12/2025</a:t>
             </a:fld>
             <a:endParaRPr lang="fr-FR"/>
           </a:p>
@@ -1978,7 +1978,7 @@
           <a:p>
             <a:fld id="{E382C574-8341-433E-8278-D812E3904DB0}" type="datetimeFigureOut">
               <a:rPr lang="fr-FR" smtClean="0"/>
-              <a:t>08/10/2025</a:t>
+              <a:t>18/12/2025</a:t>
             </a:fld>
             <a:endParaRPr lang="fr-FR"/>
           </a:p>
@@ -2091,7 +2091,7 @@
           <a:p>
             <a:fld id="{E382C574-8341-433E-8278-D812E3904DB0}" type="datetimeFigureOut">
               <a:rPr lang="fr-FR" smtClean="0"/>
-              <a:t>08/10/2025</a:t>
+              <a:t>18/12/2025</a:t>
             </a:fld>
             <a:endParaRPr lang="fr-FR"/>
           </a:p>
@@ -2404,7 +2404,7 @@
           <a:p>
             <a:fld id="{E382C574-8341-433E-8278-D812E3904DB0}" type="datetimeFigureOut">
               <a:rPr lang="fr-FR" smtClean="0"/>
-              <a:t>08/10/2025</a:t>
+              <a:t>18/12/2025</a:t>
             </a:fld>
             <a:endParaRPr lang="fr-FR"/>
           </a:p>
@@ -2693,7 +2693,7 @@
           <a:p>
             <a:fld id="{E382C574-8341-433E-8278-D812E3904DB0}" type="datetimeFigureOut">
               <a:rPr lang="fr-FR" smtClean="0"/>
-              <a:t>08/10/2025</a:t>
+              <a:t>18/12/2025</a:t>
             </a:fld>
             <a:endParaRPr lang="fr-FR"/>
           </a:p>
@@ -2936,7 +2936,7 @@
           <a:p>
             <a:fld id="{E382C574-8341-433E-8278-D812E3904DB0}" type="datetimeFigureOut">
               <a:rPr lang="fr-FR" smtClean="0"/>
-              <a:t>08/10/2025</a:t>
+              <a:t>18/12/2025</a:t>
             </a:fld>
             <a:endParaRPr lang="fr-FR"/>
           </a:p>
@@ -5605,8 +5605,8 @@
           </p:sp>
         </mc:Fallback>
       </mc:AlternateContent>
-      <mc:AlternateContent xmlns:mc="http://schemas.openxmlformats.org/markup-compatibility/2006" xmlns:a14="http://schemas.microsoft.com/office/drawing/2010/main">
-        <mc:Choice Requires="a14">
+      <mc:AlternateContent xmlns:mc="http://schemas.openxmlformats.org/markup-compatibility/2006">
+        <mc:Choice xmlns:a14="http://schemas.microsoft.com/office/drawing/2010/main" Requires="a14">
           <p:sp>
             <p:nvSpPr>
               <p:cNvPr id="21" name="TextBox 20">
@@ -5801,13 +5801,13 @@
                           </m:sSubPr>
                           <m:e>
                             <m:r>
-                              <a:rPr lang="fr-FR" sz="1800" i="1" kern="100">
+                              <a:rPr lang="fr-FR" sz="1800" b="0" i="1" kern="100" smtClean="0">
                                 <a:effectLst/>
                                 <a:latin typeface="Cambria Math" panose="02040503050406030204" pitchFamily="18" charset="0"/>
                                 <a:ea typeface="Times New Roman" panose="02020603050405020304" pitchFamily="18" charset="0"/>
                                 <a:cs typeface="Times New Roman" panose="02020603050405020304" pitchFamily="18" charset="0"/>
                               </a:rPr>
-                              <m:t>𝑋𝑆</m:t>
+                              <m:t>𝑁𝐷</m:t>
                             </m:r>
                           </m:e>
                           <m:sub>
@@ -5914,16 +5914,15 @@
                     <a:ea typeface="Cambria" panose="02040503050406030204" pitchFamily="18" charset="0"/>
                     <a:cs typeface="Times New Roman" panose="02020603050405020304" pitchFamily="18" charset="0"/>
                   </a:rPr>
-                  <a:t> by the variation of the </a:t>
+                  <a:t> by the variation of the ND (∆</a:t>
                 </a:r>
                 <a:r>
-                  <a:rPr lang="fr-FR" sz="1800" i="1" kern="100" dirty="0" err="1">
-                    <a:effectLst/>
+                  <a:rPr lang="fr-FR" i="1" kern="100" dirty="0">
                     <a:latin typeface="Cambria" panose="02040503050406030204" pitchFamily="18" charset="0"/>
                     <a:ea typeface="Cambria" panose="02040503050406030204" pitchFamily="18" charset="0"/>
                     <a:cs typeface="Times New Roman" panose="02020603050405020304" pitchFamily="18" charset="0"/>
                   </a:rPr>
-                  <a:t>microscopic</a:t>
+                  <a:t>ND</a:t>
                 </a:r>
                 <a:r>
                   <a:rPr lang="fr-FR" sz="1800" i="1" kern="100" dirty="0">
@@ -5932,7 +5931,7 @@
                     <a:ea typeface="Cambria" panose="02040503050406030204" pitchFamily="18" charset="0"/>
                     <a:cs typeface="Times New Roman" panose="02020603050405020304" pitchFamily="18" charset="0"/>
                   </a:rPr>
-                  <a:t> cross section (∆XS) </a:t>
+                  <a:t>) </a:t>
                 </a:r>
                 <a:r>
                   <a:rPr lang="fr-FR" sz="1800" b="1" i="1" kern="100" dirty="0">
@@ -6210,7 +6209,7 @@
             </p:txBody>
           </p:sp>
         </mc:Choice>
-        <mc:Fallback xmlns="">
+        <mc:Fallback>
           <p:sp>
             <p:nvSpPr>
               <p:cNvPr id="21" name="TextBox 20">
@@ -10071,8 +10070,8 @@
           </a:graphicData>
         </a:graphic>
       </p:graphicFrame>
-      <mc:AlternateContent xmlns:mc="http://schemas.openxmlformats.org/markup-compatibility/2006" xmlns:a14="http://schemas.microsoft.com/office/drawing/2010/main">
-        <mc:Choice Requires="a14">
+      <mc:AlternateContent xmlns:mc="http://schemas.openxmlformats.org/markup-compatibility/2006">
+        <mc:Choice xmlns:a14="http://schemas.microsoft.com/office/drawing/2010/main" Requires="a14">
           <p:sp>
             <p:nvSpPr>
               <p:cNvPr id="7" name="TextBox 6">
@@ -10784,7 +10783,7 @@
                     <a:ea typeface="Cambria" panose="02040503050406030204" pitchFamily="18" charset="0"/>
                     <a:cs typeface="Times New Roman" panose="02020603050405020304" pitchFamily="18" charset="0"/>
                   </a:rPr>
-                  <a:t>correlation factor between the uncertainties of the microscopic cross section of reaction </a:t>
+                  <a:t>correlation factor between the uncertainties of the ND of reaction </a:t>
                 </a:r>
                 <a:r>
                   <a:rPr lang="fr-FR" sz="1600" i="1" kern="100" dirty="0" err="1">
@@ -11034,7 +11033,7 @@
             </p:txBody>
           </p:sp>
         </mc:Choice>
-        <mc:Fallback xmlns="">
+        <mc:Fallback>
           <p:sp>
             <p:nvSpPr>
               <p:cNvPr id="7" name="TextBox 6">
@@ -11060,7 +11059,7 @@
               <a:blipFill>
                 <a:blip r:embed="rId3"/>
                 <a:stretch>
-                  <a:fillRect t="-773" b="-1804"/>
+                  <a:fillRect t="-773" r="-444" b="-1804"/>
                 </a:stretch>
               </a:blipFill>
               <a:ln w="12700">
@@ -14865,8 +14864,8 @@
           </a:graphicData>
         </a:graphic>
       </p:graphicFrame>
-      <mc:AlternateContent xmlns:mc="http://schemas.openxmlformats.org/markup-compatibility/2006" xmlns:a14="http://schemas.microsoft.com/office/drawing/2010/main">
-        <mc:Choice Requires="a14">
+      <mc:AlternateContent xmlns:mc="http://schemas.openxmlformats.org/markup-compatibility/2006">
+        <mc:Choice xmlns:a14="http://schemas.microsoft.com/office/drawing/2010/main" Requires="a14">
           <p:sp>
             <p:nvSpPr>
               <p:cNvPr id="7" name="TextBox 6">
@@ -14882,7 +14881,7 @@
             <p:spPr>
               <a:xfrm>
                 <a:off x="921509" y="3549642"/>
-                <a:ext cx="10650855" cy="3205749"/>
+                <a:ext cx="10650855" cy="2697983"/>
               </a:xfrm>
               <a:prstGeom prst="rect">
                 <a:avLst/>
@@ -15192,8 +15191,9 @@
                                   <m:r>
                                     <a:rPr lang="fr-FR" sz="1600" b="0" i="1" smtClean="0">
                                       <a:latin typeface="Cambria Math" panose="02040503050406030204" pitchFamily="18" charset="0"/>
+                                      <a:ea typeface="Cambria Math" panose="02040503050406030204" pitchFamily="18" charset="0"/>
                                     </a:rPr>
-                                    <m:t>𝑋𝑆</m:t>
+                                    <m:t>𝑁𝐷</m:t>
                                   </m:r>
                                 </m:sub>
                                 <m:sup>
@@ -15252,8 +15252,9 @@
                                   <m:r>
                                     <a:rPr lang="fr-FR" sz="1600" b="0" i="1" smtClean="0">
                                       <a:latin typeface="Cambria Math" panose="02040503050406030204" pitchFamily="18" charset="0"/>
+                                      <a:ea typeface="Cambria Math" panose="02040503050406030204" pitchFamily="18" charset="0"/>
                                     </a:rPr>
-                                    <m:t>𝑋𝑆</m:t>
+                                    <m:t>𝑁𝐷</m:t>
                                   </m:r>
                                 </m:sub>
                                 <m:sup>
@@ -15624,7 +15625,7 @@
                     <a:ea typeface="Cambria" panose="02040503050406030204" pitchFamily="18" charset="0"/>
                     <a:cs typeface="Times New Roman" panose="02020603050405020304" pitchFamily="18" charset="0"/>
                   </a:rPr>
-                  <a:t>between the uncertainties of the microscopic cross section of reaction </a:t>
+                  <a:t>between the uncertainties of the ND of reaction </a:t>
                 </a:r>
                 <a:r>
                   <a:rPr lang="fr-FR" sz="1600" i="1" kern="100" dirty="0" err="1">
@@ -15869,8 +15870,9 @@
                             <m:r>
                               <a:rPr lang="fr-FR" sz="1600" b="0" i="1" smtClean="0">
                                 <a:latin typeface="Cambria Math" panose="02040503050406030204" pitchFamily="18" charset="0"/>
+                                <a:ea typeface="Cambria Math" panose="02040503050406030204" pitchFamily="18" charset="0"/>
                               </a:rPr>
-                              <m:t>𝑋𝑆</m:t>
+                              <m:t>𝑁𝐷</m:t>
                             </m:r>
                           </m:sub>
                           <m:sup>
@@ -15928,8 +15930,9 @@
                             <m:r>
                               <a:rPr lang="fr-FR" sz="1600" b="0" i="1" smtClean="0">
                                 <a:latin typeface="Cambria Math" panose="02040503050406030204" pitchFamily="18" charset="0"/>
+                                <a:ea typeface="Cambria Math" panose="02040503050406030204" pitchFamily="18" charset="0"/>
                               </a:rPr>
-                              <m:t>𝑋𝑆</m:t>
+                              <m:t>𝑁𝐷</m:t>
                             </m:r>
                           </m:sub>
                           <m:sup>
@@ -16264,25 +16267,7 @@
                     <a:ea typeface="Cambria" panose="02040503050406030204" pitchFamily="18" charset="0"/>
                     <a:cs typeface="Times New Roman" panose="02020603050405020304" pitchFamily="18" charset="0"/>
                   </a:rPr>
-                  <a:t>) on </a:t>
-                </a:r>
-                <a:r>
-                  <a:rPr lang="fr-FR" sz="1600" i="1" kern="100" dirty="0" err="1">
-                    <a:effectLst/>
-                    <a:latin typeface="Cambria" panose="02040503050406030204" pitchFamily="18" charset="0"/>
-                    <a:ea typeface="Cambria" panose="02040503050406030204" pitchFamily="18" charset="0"/>
-                    <a:cs typeface="Times New Roman" panose="02020603050405020304" pitchFamily="18" charset="0"/>
-                  </a:rPr>
-                  <a:t>microscopic</a:t>
-                </a:r>
-                <a:r>
-                  <a:rPr lang="fr-FR" sz="1600" i="1" kern="100" dirty="0">
-                    <a:effectLst/>
-                    <a:latin typeface="Cambria" panose="02040503050406030204" pitchFamily="18" charset="0"/>
-                    <a:ea typeface="Cambria" panose="02040503050406030204" pitchFamily="18" charset="0"/>
-                    <a:cs typeface="Times New Roman" panose="02020603050405020304" pitchFamily="18" charset="0"/>
-                  </a:rPr>
-                  <a:t> </a:t>
+                  <a:t>) on ND </a:t>
                 </a:r>
                 <a:r>
                   <a:rPr lang="fr-FR" sz="1600" i="1" kern="100" dirty="0">
@@ -16290,7 +16275,7 @@
                     <a:ea typeface="Cambria" panose="02040503050406030204" pitchFamily="18" charset="0"/>
                     <a:cs typeface="Times New Roman" panose="02020603050405020304" pitchFamily="18" charset="0"/>
                   </a:rPr>
-                  <a:t>cross section of </a:t>
+                  <a:t>of </a:t>
                 </a:r>
                 <a:r>
                   <a:rPr lang="fr-FR" sz="1600" i="1" kern="100" dirty="0" err="1">
@@ -16371,7 +16356,7 @@
             </p:txBody>
           </p:sp>
         </mc:Choice>
-        <mc:Fallback xmlns="">
+        <mc:Fallback>
           <p:sp>
             <p:nvSpPr>
               <p:cNvPr id="7" name="TextBox 6">
@@ -16389,7 +16374,7 @@
             <p:spPr>
               <a:xfrm>
                 <a:off x="921509" y="3549642"/>
-                <a:ext cx="10650855" cy="3205749"/>
+                <a:ext cx="10650855" cy="2697983"/>
               </a:xfrm>
               <a:prstGeom prst="rect">
                 <a:avLst/>
@@ -16397,7 +16382,7 @@
               <a:blipFill>
                 <a:blip r:embed="rId3"/>
                 <a:stretch>
-                  <a:fillRect t="-568" b="-1136"/>
+                  <a:fillRect t="-674"/>
                 </a:stretch>
               </a:blipFill>
               <a:ln w="12700">
@@ -28608,8 +28593,8 @@
           </a:p>
         </p:txBody>
       </p:sp>
-      <mc:AlternateContent xmlns:mc="http://schemas.openxmlformats.org/markup-compatibility/2006" xmlns:a14="http://schemas.microsoft.com/office/drawing/2010/main">
-        <mc:Choice Requires="a14">
+      <mc:AlternateContent xmlns:mc="http://schemas.openxmlformats.org/markup-compatibility/2006">
+        <mc:Choice xmlns:a14="http://schemas.microsoft.com/office/drawing/2010/main" Requires="a14">
           <p:sp>
             <p:nvSpPr>
               <p:cNvPr id="21" name="TextBox 20">
@@ -28891,23 +28876,7 @@
                     <a:ea typeface="Cambria" panose="02040503050406030204" pitchFamily="18" charset="0"/>
                     <a:cs typeface="Times New Roman" panose="02020603050405020304" pitchFamily="18" charset="0"/>
                   </a:rPr>
-                  <a:t> by the variation of the </a:t>
-                </a:r>
-                <a:r>
-                  <a:rPr lang="fr-FR" sz="1600" i="1" kern="100" dirty="0" err="1">
-                    <a:latin typeface="Cambria" panose="02040503050406030204" pitchFamily="18" charset="0"/>
-                    <a:ea typeface="Cambria" panose="02040503050406030204" pitchFamily="18" charset="0"/>
-                    <a:cs typeface="Times New Roman" panose="02020603050405020304" pitchFamily="18" charset="0"/>
-                  </a:rPr>
-                  <a:t>microscopic</a:t>
-                </a:r>
-                <a:r>
-                  <a:rPr lang="fr-FR" sz="1600" i="1" kern="100" dirty="0">
-                    <a:latin typeface="Cambria" panose="02040503050406030204" pitchFamily="18" charset="0"/>
-                    <a:ea typeface="Cambria" panose="02040503050406030204" pitchFamily="18" charset="0"/>
-                    <a:cs typeface="Times New Roman" panose="02020603050405020304" pitchFamily="18" charset="0"/>
-                  </a:rPr>
-                  <a:t> cross section (∆XS) </a:t>
+                  <a:t> by the variation of the ND (∆ND) </a:t>
                 </a:r>
                 <a:r>
                   <a:rPr lang="fr-FR" sz="1600" b="1" i="1" kern="100" dirty="0">
@@ -29174,7 +29143,7 @@
             </p:txBody>
           </p:sp>
         </mc:Choice>
-        <mc:Fallback xmlns="">
+        <mc:Fallback>
           <p:sp>
             <p:nvSpPr>
               <p:cNvPr id="21" name="TextBox 20">

</xml_diff>

<commit_message>
DOC : XS to ND
</commit_message>
<xml_diff>
--- a/docs/images/Image_maker.pptx
+++ b/docs/images/Image_maker.pptx
@@ -267,7 +267,7 @@
           <a:p>
             <a:fld id="{E382C574-8341-433E-8278-D812E3904DB0}" type="datetimeFigureOut">
               <a:rPr lang="fr-FR" smtClean="0"/>
-              <a:t>18/12/2025</a:t>
+              <a:t>16/02/2026</a:t>
             </a:fld>
             <a:endParaRPr lang="fr-FR"/>
           </a:p>
@@ -467,7 +467,7 @@
           <a:p>
             <a:fld id="{E382C574-8341-433E-8278-D812E3904DB0}" type="datetimeFigureOut">
               <a:rPr lang="fr-FR" smtClean="0"/>
-              <a:t>18/12/2025</a:t>
+              <a:t>16/02/2026</a:t>
             </a:fld>
             <a:endParaRPr lang="fr-FR"/>
           </a:p>
@@ -677,7 +677,7 @@
           <a:p>
             <a:fld id="{E382C574-8341-433E-8278-D812E3904DB0}" type="datetimeFigureOut">
               <a:rPr lang="fr-FR" smtClean="0"/>
-              <a:t>18/12/2025</a:t>
+              <a:t>16/02/2026</a:t>
             </a:fld>
             <a:endParaRPr lang="fr-FR"/>
           </a:p>
@@ -877,7 +877,7 @@
           <a:p>
             <a:fld id="{E382C574-8341-433E-8278-D812E3904DB0}" type="datetimeFigureOut">
               <a:rPr lang="fr-FR" smtClean="0"/>
-              <a:t>18/12/2025</a:t>
+              <a:t>16/02/2026</a:t>
             </a:fld>
             <a:endParaRPr lang="fr-FR"/>
           </a:p>
@@ -1153,7 +1153,7 @@
           <a:p>
             <a:fld id="{E382C574-8341-433E-8278-D812E3904DB0}" type="datetimeFigureOut">
               <a:rPr lang="fr-FR" smtClean="0"/>
-              <a:t>18/12/2025</a:t>
+              <a:t>16/02/2026</a:t>
             </a:fld>
             <a:endParaRPr lang="fr-FR"/>
           </a:p>
@@ -1421,7 +1421,7 @@
           <a:p>
             <a:fld id="{E382C574-8341-433E-8278-D812E3904DB0}" type="datetimeFigureOut">
               <a:rPr lang="fr-FR" smtClean="0"/>
-              <a:t>18/12/2025</a:t>
+              <a:t>16/02/2026</a:t>
             </a:fld>
             <a:endParaRPr lang="fr-FR"/>
           </a:p>
@@ -1836,7 +1836,7 @@
           <a:p>
             <a:fld id="{E382C574-8341-433E-8278-D812E3904DB0}" type="datetimeFigureOut">
               <a:rPr lang="fr-FR" smtClean="0"/>
-              <a:t>18/12/2025</a:t>
+              <a:t>16/02/2026</a:t>
             </a:fld>
             <a:endParaRPr lang="fr-FR"/>
           </a:p>
@@ -1978,7 +1978,7 @@
           <a:p>
             <a:fld id="{E382C574-8341-433E-8278-D812E3904DB0}" type="datetimeFigureOut">
               <a:rPr lang="fr-FR" smtClean="0"/>
-              <a:t>18/12/2025</a:t>
+              <a:t>16/02/2026</a:t>
             </a:fld>
             <a:endParaRPr lang="fr-FR"/>
           </a:p>
@@ -2091,7 +2091,7 @@
           <a:p>
             <a:fld id="{E382C574-8341-433E-8278-D812E3904DB0}" type="datetimeFigureOut">
               <a:rPr lang="fr-FR" smtClean="0"/>
-              <a:t>18/12/2025</a:t>
+              <a:t>16/02/2026</a:t>
             </a:fld>
             <a:endParaRPr lang="fr-FR"/>
           </a:p>
@@ -2404,7 +2404,7 @@
           <a:p>
             <a:fld id="{E382C574-8341-433E-8278-D812E3904DB0}" type="datetimeFigureOut">
               <a:rPr lang="fr-FR" smtClean="0"/>
-              <a:t>18/12/2025</a:t>
+              <a:t>16/02/2026</a:t>
             </a:fld>
             <a:endParaRPr lang="fr-FR"/>
           </a:p>
@@ -2693,7 +2693,7 @@
           <a:p>
             <a:fld id="{E382C574-8341-433E-8278-D812E3904DB0}" type="datetimeFigureOut">
               <a:rPr lang="fr-FR" smtClean="0"/>
-              <a:t>18/12/2025</a:t>
+              <a:t>16/02/2026</a:t>
             </a:fld>
             <a:endParaRPr lang="fr-FR"/>
           </a:p>
@@ -2936,7 +2936,7 @@
           <a:p>
             <a:fld id="{E382C574-8341-433E-8278-D812E3904DB0}" type="datetimeFigureOut">
               <a:rPr lang="fr-FR" smtClean="0"/>
-              <a:t>18/12/2025</a:t>
+              <a:t>16/02/2026</a:t>
             </a:fld>
             <a:endParaRPr lang="fr-FR"/>
           </a:p>
@@ -5605,8 +5605,8 @@
           </p:sp>
         </mc:Fallback>
       </mc:AlternateContent>
-      <mc:AlternateContent xmlns:mc="http://schemas.openxmlformats.org/markup-compatibility/2006">
-        <mc:Choice xmlns:a14="http://schemas.microsoft.com/office/drawing/2010/main" Requires="a14">
+      <mc:AlternateContent xmlns:mc="http://schemas.openxmlformats.org/markup-compatibility/2006" xmlns:a14="http://schemas.microsoft.com/office/drawing/2010/main">
+        <mc:Choice Requires="a14">
           <p:sp>
             <p:nvSpPr>
               <p:cNvPr id="21" name="TextBox 20">
@@ -6209,7 +6209,7 @@
             </p:txBody>
           </p:sp>
         </mc:Choice>
-        <mc:Fallback>
+        <mc:Fallback xmlns="">
           <p:sp>
             <p:nvSpPr>
               <p:cNvPr id="21" name="TextBox 20">
@@ -10070,8 +10070,8 @@
           </a:graphicData>
         </a:graphic>
       </p:graphicFrame>
-      <mc:AlternateContent xmlns:mc="http://schemas.openxmlformats.org/markup-compatibility/2006">
-        <mc:Choice xmlns:a14="http://schemas.microsoft.com/office/drawing/2010/main" Requires="a14">
+      <mc:AlternateContent xmlns:mc="http://schemas.openxmlformats.org/markup-compatibility/2006" xmlns:a14="http://schemas.microsoft.com/office/drawing/2010/main">
+        <mc:Choice Requires="a14">
           <p:sp>
             <p:nvSpPr>
               <p:cNvPr id="7" name="TextBox 6">
@@ -11033,7 +11033,7 @@
             </p:txBody>
           </p:sp>
         </mc:Choice>
-        <mc:Fallback>
+        <mc:Fallback xmlns="">
           <p:sp>
             <p:nvSpPr>
               <p:cNvPr id="7" name="TextBox 6">
@@ -16056,7 +16056,7 @@
                                 <a:ea typeface="Cambria Math" panose="02040503050406030204" pitchFamily="18" charset="0"/>
                                 <a:cs typeface="Times New Roman" panose="02020603050405020304" pitchFamily="18" charset="0"/>
                               </a:rPr>
-                              <m:t>𝑋𝑆</m:t>
+                              <m:t>𝑁𝐷</m:t>
                             </m:r>
                           </m:sub>
                         </m:sSub>
@@ -16118,7 +16118,7 @@
                                 <a:ea typeface="Cambria Math" panose="02040503050406030204" pitchFamily="18" charset="0"/>
                                 <a:cs typeface="Times New Roman" panose="02020603050405020304" pitchFamily="18" charset="0"/>
                               </a:rPr>
-                              <m:t>𝑋𝑆</m:t>
+                              <m:t>𝑁𝐷</m:t>
                             </m:r>
                           </m:sub>
                         </m:sSub>
@@ -16180,7 +16180,7 @@
                                 <a:ea typeface="Cambria Math" panose="02040503050406030204" pitchFamily="18" charset="0"/>
                                 <a:cs typeface="Times New Roman" panose="02020603050405020304" pitchFamily="18" charset="0"/>
                               </a:rPr>
-                              <m:t>𝑋𝑆</m:t>
+                              <m:t>𝑁𝐷</m:t>
                             </m:r>
                           </m:sub>
                         </m:sSub>
@@ -28641,7 +28641,7 @@
                     <m:sSubSup>
                       <m:sSubSupPr>
                         <m:ctrlPr>
-                          <a:rPr lang="fr-FR" sz="1600" i="1" kern="100">
+                          <a:rPr lang="fr-FR" sz="1600" i="1" kern="100" smtClean="0">
                             <a:latin typeface="Cambria Math" panose="02040503050406030204" pitchFamily="18" charset="0"/>
                             <a:ea typeface="Times New Roman" panose="02020603050405020304" pitchFamily="18" charset="0"/>
                             <a:cs typeface="Times New Roman" panose="02020603050405020304" pitchFamily="18" charset="0"/>
@@ -28775,12 +28775,12 @@
                           </m:sSubPr>
                           <m:e>
                             <m:r>
-                              <a:rPr lang="fr-FR" sz="1600" i="1" kern="100">
+                              <a:rPr lang="fr-FR" sz="1600" b="0" i="1" kern="100" smtClean="0">
                                 <a:latin typeface="Cambria Math" panose="02040503050406030204" pitchFamily="18" charset="0"/>
                                 <a:ea typeface="Times New Roman" panose="02020603050405020304" pitchFamily="18" charset="0"/>
                                 <a:cs typeface="Times New Roman" panose="02020603050405020304" pitchFamily="18" charset="0"/>
                               </a:rPr>
-                              <m:t>𝑋𝑆</m:t>
+                              <m:t>𝑁𝐷</m:t>
                             </m:r>
                           </m:e>
                           <m:sub>

</xml_diff>